<commit_message>
adjusting flags, cv header, titles and section division
</commit_message>
<xml_diff>
--- a/images/section3/flags.pptx
+++ b/images/section3/flags.pptx
@@ -107,15 +107,12 @@
       </a:defRPr>
     </a:lvl9pPr>
   </p:defaultTextStyle>
+  <p:extLst>
+    <p:ext uri="{EFAFB233-063F-42B5-8137-9DF3F51BA10A}">
+      <p15:sldGuideLst xmlns:p15="http://schemas.microsoft.com/office/powerpoint/2012/main"/>
+    </p:ext>
+  </p:extLst>
 </p:presentation>
-</file>
-
-<file path=ppt/revisionInfo.xml><?xml version="1.0" encoding="utf-8"?>
-<p1510:revInfo xmlns:a="http://schemas.openxmlformats.org/drawingml/2006/main" xmlns:r="http://schemas.openxmlformats.org/officeDocument/2006/relationships" xmlns:p1510="http://schemas.microsoft.com/office/powerpoint/2015/10/main">
-  <p1510:revLst>
-    <p1510:client id="{3CFE4D1B-D6E8-4B8C-8AF7-BE806EC0D969}" v="6" dt="2023-02-13T10:05:58.100"/>
-  </p1510:revLst>
-</p1510:revInfo>
 </file>
 
 <file path=ppt/changesInfos/changesInfo1.xml><?xml version="1.0" encoding="utf-8"?>
@@ -261,6 +258,45 @@
       </pc:sldChg>
     </pc:docChg>
   </pc:docChgLst>
+  <pc:docChgLst>
+    <pc:chgData name="Lorenzo Taddei" userId="30bf616d265f9878" providerId="LiveId" clId="{0AB97BD2-0743-4355-A7B9-A8D483BDB783}"/>
+    <pc:docChg chg="modSld">
+      <pc:chgData name="Lorenzo Taddei" userId="30bf616d265f9878" providerId="LiveId" clId="{0AB97BD2-0743-4355-A7B9-A8D483BDB783}" dt="2023-02-14T10:33:03.489" v="1" actId="29295"/>
+      <pc:docMkLst>
+        <pc:docMk/>
+      </pc:docMkLst>
+      <pc:sldChg chg="modSp mod">
+        <pc:chgData name="Lorenzo Taddei" userId="30bf616d265f9878" providerId="LiveId" clId="{0AB97BD2-0743-4355-A7B9-A8D483BDB783}" dt="2023-02-14T10:32:54.879" v="0" actId="29295"/>
+        <pc:sldMkLst>
+          <pc:docMk/>
+          <pc:sldMk cId="2006234374" sldId="258"/>
+        </pc:sldMkLst>
+        <pc:picChg chg="mod">
+          <ac:chgData name="Lorenzo Taddei" userId="30bf616d265f9878" providerId="LiveId" clId="{0AB97BD2-0743-4355-A7B9-A8D483BDB783}" dt="2023-02-14T10:32:54.879" v="0" actId="29295"/>
+          <ac:picMkLst>
+            <pc:docMk/>
+            <pc:sldMk cId="2006234374" sldId="258"/>
+            <ac:picMk id="3" creationId="{2EBCFDB8-5A12-C2DA-71D7-78B9251BB786}"/>
+          </ac:picMkLst>
+        </pc:picChg>
+      </pc:sldChg>
+      <pc:sldChg chg="modSp mod">
+        <pc:chgData name="Lorenzo Taddei" userId="30bf616d265f9878" providerId="LiveId" clId="{0AB97BD2-0743-4355-A7B9-A8D483BDB783}" dt="2023-02-14T10:33:03.489" v="1" actId="29295"/>
+        <pc:sldMkLst>
+          <pc:docMk/>
+          <pc:sldMk cId="1068699948" sldId="259"/>
+        </pc:sldMkLst>
+        <pc:picChg chg="mod">
+          <ac:chgData name="Lorenzo Taddei" userId="30bf616d265f9878" providerId="LiveId" clId="{0AB97BD2-0743-4355-A7B9-A8D483BDB783}" dt="2023-02-14T10:33:03.489" v="1" actId="29295"/>
+          <ac:picMkLst>
+            <pc:docMk/>
+            <pc:sldMk cId="1068699948" sldId="259"/>
+            <ac:picMk id="4" creationId="{20B9406F-15DF-D2C4-CC8D-AB0E26347F13}"/>
+          </ac:picMkLst>
+        </pc:picChg>
+      </pc:sldChg>
+    </pc:docChg>
+  </pc:docChgLst>
 </pc:chgInfo>
 </file>
 
@@ -413,7 +449,7 @@
           <a:p>
             <a:fld id="{9A4AF60B-EE12-4DA8-A3AC-DF689C975724}" type="datetimeFigureOut">
               <a:rPr lang="it-IT" smtClean="0"/>
-              <a:t>13/02/2023</a:t>
+              <a:t>14/02/2023</a:t>
             </a:fld>
             <a:endParaRPr lang="it-IT"/>
           </a:p>
@@ -613,7 +649,7 @@
           <a:p>
             <a:fld id="{9A4AF60B-EE12-4DA8-A3AC-DF689C975724}" type="datetimeFigureOut">
               <a:rPr lang="it-IT" smtClean="0"/>
-              <a:t>13/02/2023</a:t>
+              <a:t>14/02/2023</a:t>
             </a:fld>
             <a:endParaRPr lang="it-IT"/>
           </a:p>
@@ -823,7 +859,7 @@
           <a:p>
             <a:fld id="{9A4AF60B-EE12-4DA8-A3AC-DF689C975724}" type="datetimeFigureOut">
               <a:rPr lang="it-IT" smtClean="0"/>
-              <a:t>13/02/2023</a:t>
+              <a:t>14/02/2023</a:t>
             </a:fld>
             <a:endParaRPr lang="it-IT"/>
           </a:p>
@@ -1023,7 +1059,7 @@
           <a:p>
             <a:fld id="{9A4AF60B-EE12-4DA8-A3AC-DF689C975724}" type="datetimeFigureOut">
               <a:rPr lang="it-IT" smtClean="0"/>
-              <a:t>13/02/2023</a:t>
+              <a:t>14/02/2023</a:t>
             </a:fld>
             <a:endParaRPr lang="it-IT"/>
           </a:p>
@@ -1299,7 +1335,7 @@
           <a:p>
             <a:fld id="{9A4AF60B-EE12-4DA8-A3AC-DF689C975724}" type="datetimeFigureOut">
               <a:rPr lang="it-IT" smtClean="0"/>
-              <a:t>13/02/2023</a:t>
+              <a:t>14/02/2023</a:t>
             </a:fld>
             <a:endParaRPr lang="it-IT"/>
           </a:p>
@@ -1567,7 +1603,7 @@
           <a:p>
             <a:fld id="{9A4AF60B-EE12-4DA8-A3AC-DF689C975724}" type="datetimeFigureOut">
               <a:rPr lang="it-IT" smtClean="0"/>
-              <a:t>13/02/2023</a:t>
+              <a:t>14/02/2023</a:t>
             </a:fld>
             <a:endParaRPr lang="it-IT"/>
           </a:p>
@@ -1982,7 +2018,7 @@
           <a:p>
             <a:fld id="{9A4AF60B-EE12-4DA8-A3AC-DF689C975724}" type="datetimeFigureOut">
               <a:rPr lang="it-IT" smtClean="0"/>
-              <a:t>13/02/2023</a:t>
+              <a:t>14/02/2023</a:t>
             </a:fld>
             <a:endParaRPr lang="it-IT"/>
           </a:p>
@@ -2124,7 +2160,7 @@
           <a:p>
             <a:fld id="{9A4AF60B-EE12-4DA8-A3AC-DF689C975724}" type="datetimeFigureOut">
               <a:rPr lang="it-IT" smtClean="0"/>
-              <a:t>13/02/2023</a:t>
+              <a:t>14/02/2023</a:t>
             </a:fld>
             <a:endParaRPr lang="it-IT"/>
           </a:p>
@@ -2237,7 +2273,7 @@
           <a:p>
             <a:fld id="{9A4AF60B-EE12-4DA8-A3AC-DF689C975724}" type="datetimeFigureOut">
               <a:rPr lang="it-IT" smtClean="0"/>
-              <a:t>13/02/2023</a:t>
+              <a:t>14/02/2023</a:t>
             </a:fld>
             <a:endParaRPr lang="it-IT"/>
           </a:p>
@@ -2550,7 +2586,7 @@
           <a:p>
             <a:fld id="{9A4AF60B-EE12-4DA8-A3AC-DF689C975724}" type="datetimeFigureOut">
               <a:rPr lang="it-IT" smtClean="0"/>
-              <a:t>13/02/2023</a:t>
+              <a:t>14/02/2023</a:t>
             </a:fld>
             <a:endParaRPr lang="it-IT"/>
           </a:p>
@@ -2839,7 +2875,7 @@
           <a:p>
             <a:fld id="{9A4AF60B-EE12-4DA8-A3AC-DF689C975724}" type="datetimeFigureOut">
               <a:rPr lang="it-IT" smtClean="0"/>
-              <a:t>13/02/2023</a:t>
+              <a:t>14/02/2023</a:t>
             </a:fld>
             <a:endParaRPr lang="it-IT"/>
           </a:p>
@@ -3082,7 +3118,7 @@
           <a:p>
             <a:fld id="{9A4AF60B-EE12-4DA8-A3AC-DF689C975724}" type="datetimeFigureOut">
               <a:rPr lang="it-IT" smtClean="0"/>
-              <a:t>13/02/2023</a:t>
+              <a:t>14/02/2023</a:t>
             </a:fld>
             <a:endParaRPr lang="it-IT"/>
           </a:p>
@@ -3807,6 +3843,7 @@
         </p:nvPicPr>
         <p:blipFill>
           <a:blip r:embed="rId2">
+            <a:alphaModFix amt="85000"/>
             <a:extLst>
               <a:ext uri="{28A0092B-C50C-407E-A947-70E740481C1C}">
                 <a14:useLocalDpi xmlns:a14="http://schemas.microsoft.com/office/drawing/2010/main" val="0"/>
@@ -3927,6 +3964,7 @@
         </p:nvPicPr>
         <p:blipFill>
           <a:blip r:embed="rId2">
+            <a:alphaModFix amt="85000"/>
             <a:extLst>
               <a:ext uri="{28A0092B-C50C-407E-A947-70E740481C1C}">
                 <a14:useLocalDpi xmlns:a14="http://schemas.microsoft.com/office/drawing/2010/main" val="0"/>

</xml_diff>